<commit_message>
Update the power point
</commit_message>
<xml_diff>
--- a/FLL/2018/The Others.pptx
+++ b/FLL/2018/The Others.pptx
@@ -16,18 +16,18 @@
     <p:sldId id="274" r:id="rId7"/>
     <p:sldId id="275" r:id="rId8"/>
     <p:sldId id="259" r:id="rId9"/>
-    <p:sldId id="260" r:id="rId10"/>
-    <p:sldId id="271" r:id="rId11"/>
-    <p:sldId id="261" r:id="rId12"/>
-    <p:sldId id="262" r:id="rId13"/>
-    <p:sldId id="263" r:id="rId14"/>
-    <p:sldId id="264" r:id="rId15"/>
-    <p:sldId id="265" r:id="rId16"/>
-    <p:sldId id="266" r:id="rId17"/>
-    <p:sldId id="267" r:id="rId18"/>
-    <p:sldId id="268" r:id="rId19"/>
-    <p:sldId id="269" r:id="rId20"/>
-    <p:sldId id="270" r:id="rId21"/>
+    <p:sldId id="276" r:id="rId10"/>
+    <p:sldId id="277" r:id="rId11"/>
+    <p:sldId id="260" r:id="rId12"/>
+    <p:sldId id="271" r:id="rId13"/>
+    <p:sldId id="261" r:id="rId14"/>
+    <p:sldId id="262" r:id="rId15"/>
+    <p:sldId id="263" r:id="rId16"/>
+    <p:sldId id="278" r:id="rId17"/>
+    <p:sldId id="264" r:id="rId18"/>
+    <p:sldId id="280" r:id="rId19"/>
+    <p:sldId id="281" r:id="rId20"/>
+    <p:sldId id="282" r:id="rId21"/>
   </p:sldIdLst>
   <p:sldSz cx="12192000" cy="6858000"/>
   <p:notesSz cx="6858000" cy="9144000"/>
@@ -216,7 +216,7 @@
           <a:p>
             <a:fld id="{911961E1-36B2-4545-A428-4604CE04AE58}" type="datetimeFigureOut">
               <a:rPr lang="en-US" smtClean="0"/>
-              <a:t>9/12/2018</a:t>
+              <a:t>9/13/2018</a:t>
             </a:fld>
             <a:endParaRPr lang="en-US"/>
           </a:p>
@@ -818,7 +818,7 @@
           <a:p>
             <a:fld id="{70143B14-6FD6-4C3F-B41D-D1B3BBC4FA41}" type="datetime1">
               <a:rPr lang="en-US" smtClean="0"/>
-              <a:t>9/12/2018</a:t>
+              <a:t>9/13/2018</a:t>
             </a:fld>
             <a:endParaRPr lang="en-US" dirty="0"/>
           </a:p>
@@ -1906,7 +1906,7 @@
           <a:p>
             <a:fld id="{2B3D5EFB-A2C5-49D5-83DC-90D30FB6350F}" type="datetime1">
               <a:rPr lang="en-US" smtClean="0"/>
-              <a:t>9/12/2018</a:t>
+              <a:t>9/13/2018</a:t>
             </a:fld>
             <a:endParaRPr lang="en-US" dirty="0"/>
           </a:p>
@@ -2886,7 +2886,7 @@
           <a:p>
             <a:fld id="{E58E18E1-6780-40CE-8A5F-0004DB02BD3D}" type="datetime1">
               <a:rPr lang="en-US" smtClean="0"/>
-              <a:t>9/12/2018</a:t>
+              <a:t>9/13/2018</a:t>
             </a:fld>
             <a:endParaRPr lang="en-US" dirty="0"/>
           </a:p>
@@ -4020,7 +4020,7 @@
           <a:p>
             <a:fld id="{AF6E6664-D1E6-4911-8A5C-DFA0FDC32B64}" type="datetime1">
               <a:rPr lang="en-US" smtClean="0"/>
-              <a:t>9/12/2018</a:t>
+              <a:t>9/13/2018</a:t>
             </a:fld>
             <a:endParaRPr lang="en-US" dirty="0"/>
           </a:p>
@@ -5053,7 +5053,7 @@
           <a:p>
             <a:fld id="{4938A52B-7BE6-46A0-AD7C-CEC9A349768E}" type="datetime1">
               <a:rPr lang="en-US" smtClean="0"/>
-              <a:t>9/12/2018</a:t>
+              <a:t>9/13/2018</a:t>
             </a:fld>
             <a:endParaRPr lang="en-US" dirty="0"/>
           </a:p>
@@ -5713,7 +5713,7 @@
           <a:p>
             <a:fld id="{BE4C9737-CE51-4F51-BABA-CAF573690BBB}" type="datetime1">
               <a:rPr lang="en-US" smtClean="0"/>
-              <a:t>9/12/2018</a:t>
+              <a:t>9/13/2018</a:t>
             </a:fld>
             <a:endParaRPr lang="en-US" dirty="0"/>
           </a:p>
@@ -6574,7 +6574,7 @@
           <a:p>
             <a:fld id="{A3749039-AD51-429C-B706-FC67C689CF3E}" type="datetime1">
               <a:rPr lang="en-US" smtClean="0"/>
-              <a:t>9/12/2018</a:t>
+              <a:t>9/13/2018</a:t>
             </a:fld>
             <a:endParaRPr lang="en-US" dirty="0"/>
           </a:p>
@@ -6764,7 +6764,7 @@
           <a:p>
             <a:fld id="{0A214581-BD7F-4B76-99F4-F78CC7335177}" type="datetime1">
               <a:rPr lang="en-US" smtClean="0"/>
-              <a:t>9/12/2018</a:t>
+              <a:t>9/13/2018</a:t>
             </a:fld>
             <a:endParaRPr lang="en-US" dirty="0"/>
           </a:p>
@@ -7736,7 +7736,7 @@
           <a:p>
             <a:fld id="{BA2D0570-9893-41B0-A739-7CC187D21629}" type="datetime1">
               <a:rPr lang="en-US" smtClean="0"/>
-              <a:t>9/12/2018</a:t>
+              <a:t>9/13/2018</a:t>
             </a:fld>
             <a:endParaRPr lang="en-US" dirty="0"/>
           </a:p>
@@ -7947,7 +7947,7 @@
           <a:p>
             <a:fld id="{092AE90E-617A-4487-96E2-AC54A68C24CC}" type="datetime1">
               <a:rPr lang="en-US" smtClean="0"/>
-              <a:t>9/12/2018</a:t>
+              <a:t>9/13/2018</a:t>
             </a:fld>
             <a:endParaRPr lang="en-US" dirty="0"/>
           </a:p>
@@ -8981,7 +8981,7 @@
           <a:p>
             <a:fld id="{AD59F5E3-52CF-40B3-971A-0177BE517F27}" type="datetime1">
               <a:rPr lang="en-US" smtClean="0"/>
-              <a:t>9/12/2018</a:t>
+              <a:t>9/13/2018</a:t>
             </a:fld>
             <a:endParaRPr lang="en-US" dirty="0"/>
           </a:p>
@@ -9253,7 +9253,7 @@
           <a:p>
             <a:fld id="{8E68928C-558B-4A91-AFD5-2440D4F890D6}" type="datetime1">
               <a:rPr lang="en-US" smtClean="0"/>
-              <a:t>9/12/2018</a:t>
+              <a:t>9/13/2018</a:t>
             </a:fld>
             <a:endParaRPr lang="en-US" dirty="0"/>
           </a:p>
@@ -9663,7 +9663,7 @@
           <a:p>
             <a:fld id="{ADB96B63-DB89-4BB8-A2A3-39E54310E666}" type="datetime1">
               <a:rPr lang="en-US" smtClean="0"/>
-              <a:t>9/12/2018</a:t>
+              <a:t>9/13/2018</a:t>
             </a:fld>
             <a:endParaRPr lang="en-US" dirty="0"/>
           </a:p>
@@ -9790,7 +9790,7 @@
           <a:p>
             <a:fld id="{B58A7B8E-B30A-437B-AE1A-A807AC72042F}" type="datetime1">
               <a:rPr lang="en-US" smtClean="0"/>
-              <a:t>9/12/2018</a:t>
+              <a:t>9/13/2018</a:t>
             </a:fld>
             <a:endParaRPr lang="en-US" dirty="0"/>
           </a:p>
@@ -9885,7 +9885,7 @@
           <a:p>
             <a:fld id="{4C2DFFE7-1D42-49A0-9E58-D6359F32F7C4}" type="datetime1">
               <a:rPr lang="en-US" smtClean="0"/>
-              <a:t>9/12/2018</a:t>
+              <a:t>9/13/2018</a:t>
             </a:fld>
             <a:endParaRPr lang="en-US" dirty="0"/>
           </a:p>
@@ -10966,7 +10966,7 @@
           <a:p>
             <a:fld id="{CF1F63B9-BD7C-4B4F-9081-EB50A19ABBEB}" type="datetime1">
               <a:rPr lang="en-US" smtClean="0"/>
-              <a:t>9/12/2018</a:t>
+              <a:t>9/13/2018</a:t>
             </a:fld>
             <a:endParaRPr lang="en-US" dirty="0"/>
           </a:p>
@@ -12074,7 +12074,7 @@
           <a:p>
             <a:fld id="{F66E1E34-30AA-4002-8333-378BFCACDCDA}" type="datetime1">
               <a:rPr lang="en-US" smtClean="0"/>
-              <a:t>9/12/2018</a:t>
+              <a:t>9/13/2018</a:t>
             </a:fld>
             <a:endParaRPr lang="en-US" dirty="0"/>
           </a:p>
@@ -13071,7 +13071,7 @@
           <a:p>
             <a:fld id="{79356669-9559-4BB2-8014-6E405E98D5F1}" type="datetime1">
               <a:rPr lang="en-US" smtClean="0"/>
-              <a:t>9/12/2018</a:t>
+              <a:t>9/13/2018</a:t>
             </a:fld>
             <a:endParaRPr lang="en-US" dirty="0"/>
           </a:p>
@@ -13805,54 +13805,28 @@
           <a:bodyPr/>
           <a:lstStyle/>
           <a:p>
-            <a:r>
-              <a:rPr lang="en-US" dirty="0"/>
-              <a:t>Setting up the phones</a:t>
-            </a:r>
-          </a:p>
-        </p:txBody>
-      </p:sp>
-      <p:sp>
-        <p:nvSpPr>
-          <p:cNvPr id="3" name="Content Placeholder 2">
-            <a:extLst>
-              <a:ext uri="{FF2B5EF4-FFF2-40B4-BE49-F238E27FC236}">
-                <a16:creationId xmlns:a16="http://schemas.microsoft.com/office/drawing/2014/main" id="{B50147CF-DAA8-4BEB-A969-D6D9FECE042F}"/>
-              </a:ext>
-            </a:extLst>
-          </p:cNvPr>
-          <p:cNvSpPr>
-            <a:spLocks noGrp="1"/>
-          </p:cNvSpPr>
-          <p:nvPr>
-            <p:ph idx="1"/>
-          </p:nvPr>
-        </p:nvSpPr>
-        <p:spPr/>
-        <p:txBody>
-          <a:bodyPr>
-            <a:normAutofit/>
-          </a:bodyPr>
-          <a:lstStyle/>
-          <a:p>
-            <a:r>
-              <a:rPr lang="en-US" sz="3200" dirty="0"/>
-              <a:t>The Robot controller needs a Robot Configuration to run.</a:t>
-            </a:r>
-          </a:p>
-          <a:p>
-            <a:r>
-              <a:rPr lang="en-US" sz="3200" dirty="0"/>
-              <a:t>When you name things in the configuration, you must use those names in </a:t>
-            </a:r>
-            <a:r>
-              <a:rPr lang="en-US" sz="3200"/>
-              <a:t>the programs</a:t>
-            </a:r>
-            <a:r>
-              <a:rPr lang="en-US" sz="3200" dirty="0"/>
-              <a:t>.</a:t>
-            </a:r>
+            <a:pPr lvl="1"/>
+            <a:r>
+              <a:rPr lang="en-US" sz="3200" dirty="0">
+                <a:solidFill>
+                  <a:schemeClr val="bg1"/>
+                </a:solidFill>
+              </a:rPr>
+              <a:t>Microsoft </a:t>
+            </a:r>
+            <a:r>
+              <a:rPr lang="en-US" sz="3200" dirty="0" err="1">
+                <a:solidFill>
+                  <a:schemeClr val="bg1"/>
+                </a:solidFill>
+              </a:rPr>
+              <a:t>MakeCode</a:t>
+            </a:r>
+            <a:endParaRPr lang="en-US" sz="3200" dirty="0">
+              <a:solidFill>
+                <a:schemeClr val="bg1"/>
+              </a:solidFill>
+            </a:endParaRPr>
           </a:p>
         </p:txBody>
       </p:sp>
@@ -13861,7 +13835,7 @@
           <p:cNvPr id="5" name="Footer Placeholder 4">
             <a:extLst>
               <a:ext uri="{FF2B5EF4-FFF2-40B4-BE49-F238E27FC236}">
-                <a16:creationId xmlns:a16="http://schemas.microsoft.com/office/drawing/2014/main" id="{FB164297-73AC-4BF9-BFE0-85A1AF9DD029}"/>
+                <a16:creationId xmlns:a16="http://schemas.microsoft.com/office/drawing/2014/main" id="{EC952921-544E-4F77-8675-F6260F7DB676}"/>
               </a:ext>
             </a:extLst>
           </p:cNvPr>
@@ -13874,7 +13848,7 @@
         </p:nvSpPr>
         <p:spPr>
           <a:xfrm>
-            <a:off x="214747" y="6345382"/>
+            <a:off x="145474" y="6359237"/>
             <a:ext cx="9081654" cy="374074"/>
           </a:xfrm>
         </p:spPr>
@@ -13893,10 +13867,40 @@
           </a:p>
         </p:txBody>
       </p:sp>
+      <p:pic>
+        <p:nvPicPr>
+          <p:cNvPr id="3" name="Picture 2">
+            <a:extLst>
+              <a:ext uri="{FF2B5EF4-FFF2-40B4-BE49-F238E27FC236}">
+                <a16:creationId xmlns:a16="http://schemas.microsoft.com/office/drawing/2014/main" id="{E89BB010-D472-4C1A-9899-3C48A74DAC3B}"/>
+              </a:ext>
+            </a:extLst>
+          </p:cNvPr>
+          <p:cNvPicPr>
+            <a:picLocks noChangeAspect="1"/>
+          </p:cNvPicPr>
+          <p:nvPr/>
+        </p:nvPicPr>
+        <p:blipFill>
+          <a:blip r:embed="rId2"/>
+          <a:stretch>
+            <a:fillRect/>
+          </a:stretch>
+        </p:blipFill>
+        <p:spPr>
+          <a:xfrm>
+            <a:off x="1870754" y="1556990"/>
+            <a:ext cx="8761413" cy="4925890"/>
+          </a:xfrm>
+          <a:prstGeom prst="rect">
+            <a:avLst/>
+          </a:prstGeom>
+        </p:spPr>
+      </p:pic>
     </p:spTree>
     <p:extLst>
       <p:ext uri="{BB962C8B-B14F-4D97-AF65-F5344CB8AC3E}">
-        <p14:creationId xmlns:p14="http://schemas.microsoft.com/office/powerpoint/2010/main" val="2276203360"/>
+        <p14:creationId xmlns:p14="http://schemas.microsoft.com/office/powerpoint/2010/main" val="679828407"/>
       </p:ext>
     </p:extLst>
   </p:cSld>
@@ -13946,7 +13950,7 @@
           <a:p>
             <a:r>
               <a:rPr lang="en-US" dirty="0"/>
-              <a:t>Programming</a:t>
+              <a:t>Needs a browser, and Internet connection?</a:t>
             </a:r>
           </a:p>
         </p:txBody>
@@ -13976,33 +13980,19 @@
           <a:p>
             <a:r>
               <a:rPr lang="en-US" sz="3200" dirty="0"/>
-              <a:t>You have a bunch of ways to program your robot.  </a:t>
-            </a:r>
-          </a:p>
-          <a:p>
-            <a:pPr lvl="1"/>
-            <a:r>
-              <a:rPr lang="en-US" sz="3000" dirty="0"/>
-              <a:t>Block</a:t>
-            </a:r>
-          </a:p>
-          <a:p>
-            <a:pPr lvl="1"/>
-            <a:r>
-              <a:rPr lang="en-US" sz="3000" dirty="0" err="1"/>
-              <a:t>OnBot</a:t>
-            </a:r>
-            <a:endParaRPr lang="en-US" sz="3000" dirty="0"/>
-          </a:p>
-          <a:p>
-            <a:pPr lvl="1"/>
-            <a:r>
-              <a:rPr lang="en-US" sz="3000" dirty="0" err="1"/>
-              <a:t>Andriod</a:t>
-            </a:r>
-            <a:r>
-              <a:rPr lang="en-US" sz="3000" dirty="0"/>
-              <a:t> Studio</a:t>
+              <a:t>Will it work without a Internet connection?</a:t>
+            </a:r>
+          </a:p>
+          <a:p>
+            <a:r>
+              <a:rPr lang="en-US" sz="3200" dirty="0"/>
+              <a:t>Yes!</a:t>
+            </a:r>
+          </a:p>
+          <a:p>
+            <a:r>
+              <a:rPr lang="en-US" sz="3200" dirty="0"/>
+              <a:t>It’s a HTML5 app that can run without a connection</a:t>
             </a:r>
           </a:p>
         </p:txBody>
@@ -14012,7 +14002,7 @@
           <p:cNvPr id="5" name="Footer Placeholder 4">
             <a:extLst>
               <a:ext uri="{FF2B5EF4-FFF2-40B4-BE49-F238E27FC236}">
-                <a16:creationId xmlns:a16="http://schemas.microsoft.com/office/drawing/2014/main" id="{842D4832-23D1-4065-917B-F6EC5E2733B7}"/>
+                <a16:creationId xmlns:a16="http://schemas.microsoft.com/office/drawing/2014/main" id="{82484588-9CFE-4A0D-93C3-72A99A666C57}"/>
               </a:ext>
             </a:extLst>
           </p:cNvPr>
@@ -14025,7 +14015,7 @@
         </p:nvSpPr>
         <p:spPr>
           <a:xfrm>
-            <a:off x="311728" y="6276109"/>
+            <a:off x="200892" y="6262255"/>
             <a:ext cx="9081654" cy="374074"/>
           </a:xfrm>
         </p:spPr>
@@ -14047,7 +14037,7 @@
     </p:spTree>
     <p:extLst>
       <p:ext uri="{BB962C8B-B14F-4D97-AF65-F5344CB8AC3E}">
-        <p14:creationId xmlns:p14="http://schemas.microsoft.com/office/powerpoint/2010/main" val="1531261527"/>
+        <p14:creationId xmlns:p14="http://schemas.microsoft.com/office/powerpoint/2010/main" val="3606440120"/>
       </p:ext>
     </p:extLst>
   </p:cSld>
@@ -14097,15 +14087,15 @@
           <a:p>
             <a:r>
               <a:rPr lang="en-US" dirty="0"/>
-              <a:t>Block and </a:t>
+              <a:t>The Wire </a:t>
             </a:r>
             <a:r>
               <a:rPr lang="en-US" dirty="0" err="1"/>
-              <a:t>OnBot</a:t>
+              <a:t>Digram</a:t>
             </a:r>
             <a:r>
               <a:rPr lang="en-US" dirty="0"/>
-              <a:t> connection.</a:t>
+              <a:t> takes up too much space</a:t>
             </a:r>
           </a:p>
         </p:txBody>
@@ -14135,23 +14125,17 @@
           <a:p>
             <a:r>
               <a:rPr lang="en-US" sz="3200" dirty="0"/>
-              <a:t>You will enable another WIFI connection to the Robot Controller</a:t>
+              <a:t>You can hide it.</a:t>
             </a:r>
           </a:p>
           <a:p>
             <a:r>
               <a:rPr lang="en-US" sz="3200" dirty="0"/>
-              <a:t>Use the Program and Manage menu item.</a:t>
-            </a:r>
-          </a:p>
-          <a:p>
-            <a:r>
-              <a:rPr lang="en-US" sz="3200" dirty="0"/>
-              <a:t>From this panel you will see the WIFI name and WIFI key for the robot controller</a:t>
-            </a:r>
-          </a:p>
-          <a:p>
-            <a:endParaRPr lang="en-US" sz="3000" dirty="0"/>
+              <a:t>New programs use the same name as Arduino Programs</a:t>
+            </a:r>
+          </a:p>
+          <a:p>
+            <a:endParaRPr lang="en-US" sz="3200" dirty="0"/>
           </a:p>
         </p:txBody>
       </p:sp>
@@ -14160,7 +14144,7 @@
           <p:cNvPr id="5" name="Footer Placeholder 4">
             <a:extLst>
               <a:ext uri="{FF2B5EF4-FFF2-40B4-BE49-F238E27FC236}">
-                <a16:creationId xmlns:a16="http://schemas.microsoft.com/office/drawing/2014/main" id="{371C134C-9F7D-4F5D-893E-14C6DB1B17A3}"/>
+                <a16:creationId xmlns:a16="http://schemas.microsoft.com/office/drawing/2014/main" id="{FB164297-73AC-4BF9-BFE0-85A1AF9DD029}"/>
               </a:ext>
             </a:extLst>
           </p:cNvPr>
@@ -14173,7 +14157,7 @@
         </p:nvSpPr>
         <p:spPr>
           <a:xfrm>
-            <a:off x="353291" y="6303818"/>
+            <a:off x="214747" y="6345382"/>
             <a:ext cx="9081654" cy="374074"/>
           </a:xfrm>
         </p:spPr>
@@ -14195,7 +14179,7 @@
     </p:spTree>
     <p:extLst>
       <p:ext uri="{BB962C8B-B14F-4D97-AF65-F5344CB8AC3E}">
-        <p14:creationId xmlns:p14="http://schemas.microsoft.com/office/powerpoint/2010/main" val="2549125896"/>
+        <p14:creationId xmlns:p14="http://schemas.microsoft.com/office/powerpoint/2010/main" val="2276203360"/>
       </p:ext>
     </p:extLst>
   </p:cSld>
@@ -14245,25 +14229,54 @@
           <a:p>
             <a:r>
               <a:rPr lang="en-US" dirty="0"/>
-              <a:t>Block and </a:t>
-            </a:r>
-            <a:r>
-              <a:rPr lang="en-US" dirty="0" err="1"/>
-              <a:t>OnBot</a:t>
-            </a:r>
-            <a:r>
-              <a:rPr lang="en-US" dirty="0"/>
-              <a:t> connection.</a:t>
+              <a:t>First Program, go forward 1 second</a:t>
             </a:r>
           </a:p>
         </p:txBody>
       </p:sp>
       <p:sp>
         <p:nvSpPr>
-          <p:cNvPr id="3" name="Content Placeholder 2">
+          <p:cNvPr id="5" name="Footer Placeholder 4">
             <a:extLst>
               <a:ext uri="{FF2B5EF4-FFF2-40B4-BE49-F238E27FC236}">
-                <a16:creationId xmlns:a16="http://schemas.microsoft.com/office/drawing/2014/main" id="{B50147CF-DAA8-4BEB-A969-D6D9FECE042F}"/>
+                <a16:creationId xmlns:a16="http://schemas.microsoft.com/office/drawing/2014/main" id="{842D4832-23D1-4065-917B-F6EC5E2733B7}"/>
+              </a:ext>
+            </a:extLst>
+          </p:cNvPr>
+          <p:cNvSpPr>
+            <a:spLocks noGrp="1"/>
+          </p:cNvSpPr>
+          <p:nvPr>
+            <p:ph type="ftr" sz="quarter" idx="11"/>
+          </p:nvPr>
+        </p:nvSpPr>
+        <p:spPr>
+          <a:xfrm>
+            <a:off x="311728" y="6276109"/>
+            <a:ext cx="9081654" cy="374074"/>
+          </a:xfrm>
+        </p:spPr>
+        <p:txBody>
+          <a:bodyPr/>
+          <a:lstStyle/>
+          <a:p>
+            <a:r>
+              <a:rPr lang="en-US" sz="2400" dirty="0">
+                <a:solidFill>
+                  <a:schemeClr val="tx1"/>
+                </a:solidFill>
+              </a:rPr>
+              <a:t>https://github.com/JimWright4089/FIRSTWorkshops</a:t>
+            </a:r>
+          </a:p>
+        </p:txBody>
+      </p:sp>
+      <p:sp>
+        <p:nvSpPr>
+          <p:cNvPr id="6" name="Content Placeholder 5">
+            <a:extLst>
+              <a:ext uri="{FF2B5EF4-FFF2-40B4-BE49-F238E27FC236}">
+                <a16:creationId xmlns:a16="http://schemas.microsoft.com/office/drawing/2014/main" id="{4B8AACBF-BC98-49F7-BF11-56433B09565B}"/>
               </a:ext>
             </a:extLst>
           </p:cNvPr>
@@ -14276,86 +14289,47 @@
         </p:nvSpPr>
         <p:spPr/>
         <p:txBody>
-          <a:bodyPr>
-            <a:normAutofit fontScale="85000" lnSpcReduction="20000"/>
-          </a:bodyPr>
+          <a:bodyPr/>
           <a:lstStyle/>
           <a:p>
-            <a:r>
-              <a:rPr lang="en-US" sz="3200" dirty="0"/>
-              <a:t>You will enable another WIFI connection to the Robot Controller</a:t>
-            </a:r>
-          </a:p>
-          <a:p>
-            <a:r>
-              <a:rPr lang="en-US" sz="3200" dirty="0"/>
-              <a:t>Use the Program and Manage menu item.</a:t>
-            </a:r>
-          </a:p>
-          <a:p>
-            <a:r>
-              <a:rPr lang="en-US" sz="3200" dirty="0"/>
-              <a:t>From this panel you will see the WIFI name and WIFI key for the robot controller.</a:t>
-            </a:r>
-          </a:p>
-          <a:p>
-            <a:r>
-              <a:rPr lang="en-US" sz="3200" dirty="0"/>
-              <a:t>Point your browser to the IP address on the RC.  Something like:</a:t>
-            </a:r>
-          </a:p>
-          <a:p>
-            <a:r>
-              <a:rPr lang="en-US" sz="3200" dirty="0"/>
-              <a:t>http://192.168.49.1:8080</a:t>
-            </a:r>
-          </a:p>
-          <a:p>
-            <a:endParaRPr lang="en-US" sz="3000" dirty="0"/>
+            <a:endParaRPr lang="en-US" dirty="0"/>
           </a:p>
         </p:txBody>
       </p:sp>
-      <p:sp>
-        <p:nvSpPr>
-          <p:cNvPr id="5" name="Footer Placeholder 4">
+      <p:pic>
+        <p:nvPicPr>
+          <p:cNvPr id="7" name="Picture 6">
             <a:extLst>
               <a:ext uri="{FF2B5EF4-FFF2-40B4-BE49-F238E27FC236}">
-                <a16:creationId xmlns:a16="http://schemas.microsoft.com/office/drawing/2014/main" id="{476CB752-75DD-47F4-8370-586F794494CB}"/>
+                <a16:creationId xmlns:a16="http://schemas.microsoft.com/office/drawing/2014/main" id="{FB9AF478-1770-4203-8085-6EBD6440A6D6}"/>
               </a:ext>
             </a:extLst>
           </p:cNvPr>
-          <p:cNvSpPr>
-            <a:spLocks noGrp="1"/>
-          </p:cNvSpPr>
-          <p:nvPr>
-            <p:ph type="ftr" sz="quarter" idx="11"/>
-          </p:nvPr>
-        </p:nvSpPr>
+          <p:cNvPicPr>
+            <a:picLocks noChangeAspect="1"/>
+          </p:cNvPicPr>
+          <p:nvPr/>
+        </p:nvPicPr>
+        <p:blipFill>
+          <a:blip r:embed="rId2"/>
+          <a:stretch>
+            <a:fillRect/>
+          </a:stretch>
+        </p:blipFill>
         <p:spPr>
           <a:xfrm>
-            <a:off x="561110" y="6220691"/>
-            <a:ext cx="9081654" cy="374074"/>
+            <a:off x="1154954" y="2245894"/>
+            <a:ext cx="7787597" cy="3773906"/>
           </a:xfrm>
+          <a:prstGeom prst="rect">
+            <a:avLst/>
+          </a:prstGeom>
         </p:spPr>
-        <p:txBody>
-          <a:bodyPr/>
-          <a:lstStyle/>
-          <a:p>
-            <a:r>
-              <a:rPr lang="en-US" sz="2400" dirty="0">
-                <a:solidFill>
-                  <a:schemeClr val="tx1"/>
-                </a:solidFill>
-              </a:rPr>
-              <a:t>https://github.com/JimWright4089/FIRSTWorkshops</a:t>
-            </a:r>
-          </a:p>
-        </p:txBody>
-      </p:sp>
+      </p:pic>
     </p:spTree>
     <p:extLst>
       <p:ext uri="{BB962C8B-B14F-4D97-AF65-F5344CB8AC3E}">
-        <p14:creationId xmlns:p14="http://schemas.microsoft.com/office/powerpoint/2010/main" val="2583903155"/>
+        <p14:creationId xmlns:p14="http://schemas.microsoft.com/office/powerpoint/2010/main" val="1531261527"/>
       </p:ext>
     </p:extLst>
   </p:cSld>
@@ -14405,17 +14379,54 @@
           <a:p>
             <a:r>
               <a:rPr lang="en-US" dirty="0"/>
-              <a:t>Block</a:t>
+              <a:t>Wait, what is that button!</a:t>
             </a:r>
           </a:p>
         </p:txBody>
       </p:sp>
       <p:sp>
         <p:nvSpPr>
-          <p:cNvPr id="3" name="Content Placeholder 2">
+          <p:cNvPr id="5" name="Footer Placeholder 4">
             <a:extLst>
               <a:ext uri="{FF2B5EF4-FFF2-40B4-BE49-F238E27FC236}">
-                <a16:creationId xmlns:a16="http://schemas.microsoft.com/office/drawing/2014/main" id="{B50147CF-DAA8-4BEB-A969-D6D9FECE042F}"/>
+                <a16:creationId xmlns:a16="http://schemas.microsoft.com/office/drawing/2014/main" id="{371C134C-9F7D-4F5D-893E-14C6DB1B17A3}"/>
+              </a:ext>
+            </a:extLst>
+          </p:cNvPr>
+          <p:cNvSpPr>
+            <a:spLocks noGrp="1"/>
+          </p:cNvSpPr>
+          <p:nvPr>
+            <p:ph type="ftr" sz="quarter" idx="11"/>
+          </p:nvPr>
+        </p:nvSpPr>
+        <p:spPr>
+          <a:xfrm>
+            <a:off x="353291" y="6303818"/>
+            <a:ext cx="9081654" cy="374074"/>
+          </a:xfrm>
+        </p:spPr>
+        <p:txBody>
+          <a:bodyPr/>
+          <a:lstStyle/>
+          <a:p>
+            <a:r>
+              <a:rPr lang="en-US" sz="2400" dirty="0">
+                <a:solidFill>
+                  <a:schemeClr val="tx1"/>
+                </a:solidFill>
+              </a:rPr>
+              <a:t>https://github.com/JimWright4089/FIRSTWorkshops</a:t>
+            </a:r>
+          </a:p>
+        </p:txBody>
+      </p:sp>
+      <p:sp>
+        <p:nvSpPr>
+          <p:cNvPr id="6" name="Content Placeholder 5">
+            <a:extLst>
+              <a:ext uri="{FF2B5EF4-FFF2-40B4-BE49-F238E27FC236}">
+                <a16:creationId xmlns:a16="http://schemas.microsoft.com/office/drawing/2014/main" id="{4F48B3C2-294F-493C-B6AB-11BA5407B47C}"/>
               </a:ext>
             </a:extLst>
           </p:cNvPr>
@@ -14428,27 +14439,19 @@
         </p:nvSpPr>
         <p:spPr/>
         <p:txBody>
-          <a:bodyPr>
-            <a:normAutofit/>
-          </a:bodyPr>
+          <a:bodyPr/>
           <a:lstStyle/>
           <a:p>
-            <a:r>
-              <a:rPr lang="en-US" sz="3200" dirty="0"/>
-              <a:t>Screen:</a:t>
-            </a:r>
-          </a:p>
-          <a:p>
-            <a:endParaRPr lang="en-US" sz="3000" dirty="0"/>
+            <a:endParaRPr lang="en-US"/>
           </a:p>
         </p:txBody>
       </p:sp>
       <p:pic>
         <p:nvPicPr>
-          <p:cNvPr id="4" name="Picture 3">
+          <p:cNvPr id="7" name="Picture 6">
             <a:extLst>
               <a:ext uri="{FF2B5EF4-FFF2-40B4-BE49-F238E27FC236}">
-                <a16:creationId xmlns:a16="http://schemas.microsoft.com/office/drawing/2014/main" id="{49BBB2A1-B6C5-4879-A9AC-65E9919ABD13}"/>
+                <a16:creationId xmlns:a16="http://schemas.microsoft.com/office/drawing/2014/main" id="{8AA12618-7814-4F36-B368-B3DCE87E5BB8}"/>
               </a:ext>
             </a:extLst>
           </p:cNvPr>
@@ -14465,55 +14468,18 @@
         </p:blipFill>
         <p:spPr>
           <a:xfrm>
-            <a:off x="971550" y="3339245"/>
-            <a:ext cx="10732770" cy="3994436"/>
+            <a:off x="1342828" y="1776865"/>
+            <a:ext cx="8092117" cy="4713990"/>
           </a:xfrm>
           <a:prstGeom prst="rect">
             <a:avLst/>
           </a:prstGeom>
         </p:spPr>
       </p:pic>
-      <p:sp>
-        <p:nvSpPr>
-          <p:cNvPr id="6" name="Footer Placeholder 4">
-            <a:extLst>
-              <a:ext uri="{FF2B5EF4-FFF2-40B4-BE49-F238E27FC236}">
-                <a16:creationId xmlns:a16="http://schemas.microsoft.com/office/drawing/2014/main" id="{693CE176-A259-4948-956E-88326ECB13CD}"/>
-              </a:ext>
-            </a:extLst>
-          </p:cNvPr>
-          <p:cNvSpPr>
-            <a:spLocks noGrp="1"/>
-          </p:cNvSpPr>
-          <p:nvPr>
-            <p:ph type="ftr" sz="quarter" idx="11"/>
-          </p:nvPr>
-        </p:nvSpPr>
-        <p:spPr>
-          <a:xfrm>
-            <a:off x="270165" y="6381471"/>
-            <a:ext cx="9081654" cy="374074"/>
-          </a:xfrm>
-        </p:spPr>
-        <p:txBody>
-          <a:bodyPr/>
-          <a:lstStyle/>
-          <a:p>
-            <a:r>
-              <a:rPr lang="en-US" sz="2400" dirty="0">
-                <a:solidFill>
-                  <a:schemeClr val="tx1"/>
-                </a:solidFill>
-              </a:rPr>
-              <a:t>https://github.com/JimWright4089/FIRSTWorkshops</a:t>
-            </a:r>
-          </a:p>
-        </p:txBody>
-      </p:sp>
     </p:spTree>
     <p:extLst>
       <p:ext uri="{BB962C8B-B14F-4D97-AF65-F5344CB8AC3E}">
-        <p14:creationId xmlns:p14="http://schemas.microsoft.com/office/powerpoint/2010/main" val="2930123763"/>
+        <p14:creationId xmlns:p14="http://schemas.microsoft.com/office/powerpoint/2010/main" val="2549125896"/>
       </p:ext>
     </p:extLst>
   </p:cSld>
@@ -14563,26 +14529,86 @@
           <a:p>
             <a:r>
               <a:rPr lang="en-US" dirty="0"/>
-              <a:t>Block</a:t>
-            </a:r>
+              <a:t>Functions</a:t>
+            </a:r>
+          </a:p>
+        </p:txBody>
+      </p:sp>
+      <p:sp>
+        <p:nvSpPr>
+          <p:cNvPr id="5" name="Footer Placeholder 4">
+            <a:extLst>
+              <a:ext uri="{FF2B5EF4-FFF2-40B4-BE49-F238E27FC236}">
+                <a16:creationId xmlns:a16="http://schemas.microsoft.com/office/drawing/2014/main" id="{476CB752-75DD-47F4-8370-586F794494CB}"/>
+              </a:ext>
+            </a:extLst>
+          </p:cNvPr>
+          <p:cNvSpPr>
+            <a:spLocks noGrp="1"/>
+          </p:cNvSpPr>
+          <p:nvPr>
+            <p:ph type="ftr" sz="quarter" idx="11"/>
+          </p:nvPr>
+        </p:nvSpPr>
+        <p:spPr>
+          <a:xfrm>
+            <a:off x="561110" y="6220691"/>
+            <a:ext cx="9081654" cy="374074"/>
+          </a:xfrm>
+        </p:spPr>
+        <p:txBody>
+          <a:bodyPr/>
+          <a:lstStyle/>
+          <a:p>
+            <a:r>
+              <a:rPr lang="en-US" sz="2400" dirty="0">
+                <a:solidFill>
+                  <a:schemeClr val="tx1"/>
+                </a:solidFill>
+              </a:rPr>
+              <a:t>https://github.com/JimWright4089/FIRSTWorkshops</a:t>
+            </a:r>
+          </a:p>
+        </p:txBody>
+      </p:sp>
+      <p:sp>
+        <p:nvSpPr>
+          <p:cNvPr id="6" name="Content Placeholder 5">
+            <a:extLst>
+              <a:ext uri="{FF2B5EF4-FFF2-40B4-BE49-F238E27FC236}">
+                <a16:creationId xmlns:a16="http://schemas.microsoft.com/office/drawing/2014/main" id="{8B087449-FC33-4468-A0A6-8BB82A047955}"/>
+              </a:ext>
+            </a:extLst>
+          </p:cNvPr>
+          <p:cNvSpPr>
+            <a:spLocks noGrp="1"/>
+          </p:cNvSpPr>
+          <p:nvPr>
+            <p:ph idx="1"/>
+          </p:nvPr>
+        </p:nvSpPr>
+        <p:spPr/>
+        <p:txBody>
+          <a:bodyPr/>
+          <a:lstStyle/>
+          <a:p>
+            <a:endParaRPr lang="en-US"/>
           </a:p>
         </p:txBody>
       </p:sp>
       <p:pic>
         <p:nvPicPr>
-          <p:cNvPr id="7" name="Content Placeholder 6">
+          <p:cNvPr id="7" name="Picture 6">
             <a:extLst>
               <a:ext uri="{FF2B5EF4-FFF2-40B4-BE49-F238E27FC236}">
-                <a16:creationId xmlns:a16="http://schemas.microsoft.com/office/drawing/2014/main" id="{69678FFE-5F16-404A-BB29-3C005FE91A9E}"/>
+                <a16:creationId xmlns:a16="http://schemas.microsoft.com/office/drawing/2014/main" id="{1B32131F-79FB-49B1-8E91-03F691AC0325}"/>
               </a:ext>
             </a:extLst>
           </p:cNvPr>
           <p:cNvPicPr>
-            <a:picLocks noGrp="1" noChangeAspect="1"/>
+            <a:picLocks noChangeAspect="1"/>
           </p:cNvPicPr>
-          <p:nvPr>
-            <p:ph idx="1"/>
-          </p:nvPr>
+          <p:nvPr/>
         </p:nvPicPr>
         <p:blipFill>
           <a:blip r:embed="rId2"/>
@@ -14592,15 +14618,18 @@
         </p:blipFill>
         <p:spPr>
           <a:xfrm>
-            <a:off x="3639131" y="2279943"/>
-            <a:ext cx="8651343" cy="7288678"/>
+            <a:off x="1154954" y="1626413"/>
+            <a:ext cx="9447809" cy="4648497"/>
           </a:xfrm>
+          <a:prstGeom prst="rect">
+            <a:avLst/>
+          </a:prstGeom>
         </p:spPr>
       </p:pic>
     </p:spTree>
     <p:extLst>
       <p:ext uri="{BB962C8B-B14F-4D97-AF65-F5344CB8AC3E}">
-        <p14:creationId xmlns:p14="http://schemas.microsoft.com/office/powerpoint/2010/main" val="471105010"/>
+        <p14:creationId xmlns:p14="http://schemas.microsoft.com/office/powerpoint/2010/main" val="2583903155"/>
       </p:ext>
     </p:extLst>
   </p:cSld>
@@ -14650,17 +14679,84 @@
           <a:p>
             <a:r>
               <a:rPr lang="en-US" dirty="0"/>
-              <a:t>Block</a:t>
+              <a:t>Functions</a:t>
+            </a:r>
+          </a:p>
+        </p:txBody>
+      </p:sp>
+      <p:sp>
+        <p:nvSpPr>
+          <p:cNvPr id="5" name="Footer Placeholder 4">
+            <a:extLst>
+              <a:ext uri="{FF2B5EF4-FFF2-40B4-BE49-F238E27FC236}">
+                <a16:creationId xmlns:a16="http://schemas.microsoft.com/office/drawing/2014/main" id="{476CB752-75DD-47F4-8370-586F794494CB}"/>
+              </a:ext>
+            </a:extLst>
+          </p:cNvPr>
+          <p:cNvSpPr>
+            <a:spLocks noGrp="1"/>
+          </p:cNvSpPr>
+          <p:nvPr>
+            <p:ph type="ftr" sz="quarter" idx="11"/>
+          </p:nvPr>
+        </p:nvSpPr>
+        <p:spPr>
+          <a:xfrm>
+            <a:off x="561110" y="6220691"/>
+            <a:ext cx="9081654" cy="374074"/>
+          </a:xfrm>
+        </p:spPr>
+        <p:txBody>
+          <a:bodyPr/>
+          <a:lstStyle/>
+          <a:p>
+            <a:r>
+              <a:rPr lang="en-US" sz="2400" dirty="0">
+                <a:solidFill>
+                  <a:schemeClr val="tx1"/>
+                </a:solidFill>
+              </a:rPr>
+              <a:t>https://github.com/JimWright4089/FIRSTWorkshops</a:t>
             </a:r>
           </a:p>
         </p:txBody>
       </p:sp>
       <p:pic>
         <p:nvPicPr>
-          <p:cNvPr id="6" name="Content Placeholder 5">
+          <p:cNvPr id="3" name="Picture 2">
             <a:extLst>
               <a:ext uri="{FF2B5EF4-FFF2-40B4-BE49-F238E27FC236}">
-                <a16:creationId xmlns:a16="http://schemas.microsoft.com/office/drawing/2014/main" id="{7DD3720B-B3E8-49D3-A03E-9409F686B6B4}"/>
+                <a16:creationId xmlns:a16="http://schemas.microsoft.com/office/drawing/2014/main" id="{9A37FD7D-B2EF-4976-A59F-EEA1709846E9}"/>
+              </a:ext>
+            </a:extLst>
+          </p:cNvPr>
+          <p:cNvPicPr>
+            <a:picLocks noChangeAspect="1"/>
+          </p:cNvPicPr>
+          <p:nvPr/>
+        </p:nvPicPr>
+        <p:blipFill>
+          <a:blip r:embed="rId2"/>
+          <a:stretch>
+            <a:fillRect/>
+          </a:stretch>
+        </p:blipFill>
+        <p:spPr>
+          <a:xfrm>
+            <a:off x="561110" y="1919347"/>
+            <a:ext cx="4433219" cy="4301344"/>
+          </a:xfrm>
+          <a:prstGeom prst="rect">
+            <a:avLst/>
+          </a:prstGeom>
+        </p:spPr>
+      </p:pic>
+      <p:pic>
+        <p:nvPicPr>
+          <p:cNvPr id="4" name="Content Placeholder 3">
+            <a:extLst>
+              <a:ext uri="{FF2B5EF4-FFF2-40B4-BE49-F238E27FC236}">
+                <a16:creationId xmlns:a16="http://schemas.microsoft.com/office/drawing/2014/main" id="{520D6E7A-9B9C-4AE3-8BFA-1A60C64BD6CB}"/>
               </a:ext>
             </a:extLst>
           </p:cNvPr>
@@ -14672,22 +14768,25 @@
           </p:nvPr>
         </p:nvPicPr>
         <p:blipFill>
-          <a:blip r:embed="rId2"/>
+          <a:blip r:embed="rId3"/>
           <a:stretch>
             <a:fillRect/>
           </a:stretch>
         </p:blipFill>
         <p:spPr>
           <a:xfrm>
-            <a:off x="1810987" y="2181469"/>
-            <a:ext cx="9541640" cy="12861995"/>
+            <a:off x="4031319" y="3429000"/>
+            <a:ext cx="8160681" cy="1972634"/>
           </a:xfrm>
+          <a:prstGeom prst="rect">
+            <a:avLst/>
+          </a:prstGeom>
         </p:spPr>
       </p:pic>
     </p:spTree>
     <p:extLst>
       <p:ext uri="{BB962C8B-B14F-4D97-AF65-F5344CB8AC3E}">
-        <p14:creationId xmlns:p14="http://schemas.microsoft.com/office/powerpoint/2010/main" val="721939334"/>
+        <p14:creationId xmlns:p14="http://schemas.microsoft.com/office/powerpoint/2010/main" val="459488390"/>
       </p:ext>
     </p:extLst>
   </p:cSld>
@@ -14736,8 +14835,12 @@
           <a:lstStyle/>
           <a:p>
             <a:r>
+              <a:rPr lang="en-US" dirty="0"/>
+              <a:t>The Help is </a:t>
+            </a:r>
+            <a:r>
               <a:rPr lang="en-US" dirty="0" err="1"/>
-              <a:t>OnBot</a:t>
+              <a:t>brillianrt</a:t>
             </a:r>
             <a:endParaRPr lang="en-US" dirty="0"/>
           </a:p>
@@ -14745,46 +14848,10 @@
       </p:sp>
       <p:sp>
         <p:nvSpPr>
-          <p:cNvPr id="3" name="Content Placeholder 2">
+          <p:cNvPr id="6" name="Footer Placeholder 4">
             <a:extLst>
               <a:ext uri="{FF2B5EF4-FFF2-40B4-BE49-F238E27FC236}">
-                <a16:creationId xmlns:a16="http://schemas.microsoft.com/office/drawing/2014/main" id="{B50147CF-DAA8-4BEB-A969-D6D9FECE042F}"/>
-              </a:ext>
-            </a:extLst>
-          </p:cNvPr>
-          <p:cNvSpPr>
-            <a:spLocks noGrp="1"/>
-          </p:cNvSpPr>
-          <p:nvPr>
-            <p:ph idx="1"/>
-          </p:nvPr>
-        </p:nvSpPr>
-        <p:spPr/>
-        <p:txBody>
-          <a:bodyPr>
-            <a:normAutofit/>
-          </a:bodyPr>
-          <a:lstStyle/>
-          <a:p>
-            <a:r>
-              <a:rPr lang="en-US" sz="3200" dirty="0"/>
-              <a:t>Standard Java, just on the robot!</a:t>
-            </a:r>
-          </a:p>
-          <a:p>
-            <a:endParaRPr lang="en-US" sz="3200" dirty="0"/>
-          </a:p>
-          <a:p>
-            <a:endParaRPr lang="en-US" sz="3000" dirty="0"/>
-          </a:p>
-        </p:txBody>
-      </p:sp>
-      <p:sp>
-        <p:nvSpPr>
-          <p:cNvPr id="5" name="Footer Placeholder 4">
-            <a:extLst>
-              <a:ext uri="{FF2B5EF4-FFF2-40B4-BE49-F238E27FC236}">
-                <a16:creationId xmlns:a16="http://schemas.microsoft.com/office/drawing/2014/main" id="{4C814A7E-9E31-43BD-86E9-526B071558D0}"/>
+                <a16:creationId xmlns:a16="http://schemas.microsoft.com/office/drawing/2014/main" id="{693CE176-A259-4948-956E-88326ECB13CD}"/>
               </a:ext>
             </a:extLst>
           </p:cNvPr>
@@ -14797,7 +14864,7 @@
         </p:nvSpPr>
         <p:spPr>
           <a:xfrm>
-            <a:off x="561110" y="6220691"/>
+            <a:off x="270165" y="6381471"/>
             <a:ext cx="9081654" cy="374074"/>
           </a:xfrm>
         </p:spPr>
@@ -14816,10 +14883,42 @@
           </a:p>
         </p:txBody>
       </p:sp>
+      <p:pic>
+        <p:nvPicPr>
+          <p:cNvPr id="8" name="Content Placeholder 7">
+            <a:extLst>
+              <a:ext uri="{FF2B5EF4-FFF2-40B4-BE49-F238E27FC236}">
+                <a16:creationId xmlns:a16="http://schemas.microsoft.com/office/drawing/2014/main" id="{BC4FD30F-D66D-4D75-844D-4264A42F23A5}"/>
+              </a:ext>
+            </a:extLst>
+          </p:cNvPr>
+          <p:cNvPicPr>
+            <a:picLocks noGrp="1" noChangeAspect="1"/>
+          </p:cNvPicPr>
+          <p:nvPr>
+            <p:ph idx="1"/>
+          </p:nvPr>
+        </p:nvPicPr>
+        <p:blipFill>
+          <a:blip r:embed="rId2"/>
+          <a:stretch>
+            <a:fillRect/>
+          </a:stretch>
+        </p:blipFill>
+        <p:spPr>
+          <a:xfrm>
+            <a:off x="3619729" y="2468032"/>
+            <a:ext cx="3353892" cy="3416300"/>
+          </a:xfrm>
+          <a:prstGeom prst="rect">
+            <a:avLst/>
+          </a:prstGeom>
+        </p:spPr>
+      </p:pic>
     </p:spTree>
     <p:extLst>
       <p:ext uri="{BB962C8B-B14F-4D97-AF65-F5344CB8AC3E}">
-        <p14:creationId xmlns:p14="http://schemas.microsoft.com/office/powerpoint/2010/main" val="3339355553"/>
+        <p14:creationId xmlns:p14="http://schemas.microsoft.com/office/powerpoint/2010/main" val="2930123763"/>
       </p:ext>
     </p:extLst>
   </p:cSld>
@@ -14868,10 +14967,9 @@
           <a:lstStyle/>
           <a:p>
             <a:r>
-              <a:rPr lang="en-US" dirty="0" err="1"/>
-              <a:t>OnBot</a:t>
-            </a:r>
-            <a:endParaRPr lang="en-US" dirty="0"/>
+              <a:rPr lang="en-US" dirty="0"/>
+              <a:t>Downloading to EV3</a:t>
+            </a:r>
           </a:p>
         </p:txBody>
       </p:sp>
@@ -14891,125 +14989,31 @@
             <p:ph idx="1"/>
           </p:nvPr>
         </p:nvSpPr>
-        <p:spPr>
-          <a:xfrm>
-            <a:off x="1154954" y="2603500"/>
-            <a:ext cx="8825659" cy="4254500"/>
-          </a:xfrm>
-        </p:spPr>
+        <p:spPr/>
         <p:txBody>
           <a:bodyPr>
-            <a:normAutofit/>
+            <a:normAutofit fontScale="92500"/>
           </a:bodyPr>
           <a:lstStyle/>
           <a:p>
             <a:r>
-              <a:rPr lang="en-US" dirty="0" err="1"/>
-              <a:t>rightMotor</a:t>
-            </a:r>
-            <a:r>
-              <a:rPr lang="en-US" dirty="0"/>
-              <a:t> = </a:t>
-            </a:r>
-            <a:r>
-              <a:rPr lang="en-US" dirty="0" err="1"/>
-              <a:t>hardwareMap.dcMotor.get</a:t>
-            </a:r>
-            <a:r>
-              <a:rPr lang="en-US" dirty="0"/>
-              <a:t>("Right");</a:t>
-            </a:r>
-          </a:p>
-          <a:p>
-            <a:endParaRPr lang="en-US" dirty="0"/>
-          </a:p>
-          <a:p>
-            <a:r>
-              <a:rPr lang="en-US" dirty="0" err="1"/>
-              <a:t>rightMotor.setDirection</a:t>
-            </a:r>
-            <a:r>
-              <a:rPr lang="en-US" dirty="0"/>
-              <a:t>(</a:t>
-            </a:r>
-            <a:r>
-              <a:rPr lang="en-US" dirty="0" err="1"/>
-              <a:t>DcMotor.Direction.REVERSE</a:t>
-            </a:r>
-            <a:r>
-              <a:rPr lang="en-US" dirty="0"/>
-              <a:t>);// Set to FORWARD if using </a:t>
-            </a:r>
-            <a:r>
-              <a:rPr lang="en-US" dirty="0" err="1"/>
-              <a:t>AndyMark</a:t>
-            </a:r>
-            <a:r>
-              <a:rPr lang="en-US" dirty="0"/>
-              <a:t> motors</a:t>
-            </a:r>
-          </a:p>
-          <a:p>
-            <a:endParaRPr lang="en-US" dirty="0"/>
-          </a:p>
-          <a:p>
-            <a:r>
-              <a:rPr lang="en-US" dirty="0" err="1"/>
-              <a:t>rightMotor.setMode</a:t>
-            </a:r>
-            <a:r>
-              <a:rPr lang="en-US" dirty="0"/>
-              <a:t>(</a:t>
-            </a:r>
-            <a:r>
-              <a:rPr lang="en-US" dirty="0" err="1"/>
-              <a:t>DcMotor.RunMode.STOP_AND_RESET_ENCODER</a:t>
-            </a:r>
-            <a:r>
-              <a:rPr lang="en-US" dirty="0"/>
-              <a:t>);</a:t>
-            </a:r>
-          </a:p>
-          <a:p>
-            <a:r>
-              <a:rPr lang="en-US" dirty="0" err="1"/>
-              <a:t>rightMotor.setMode</a:t>
-            </a:r>
-            <a:r>
-              <a:rPr lang="en-US" dirty="0"/>
-              <a:t>(</a:t>
-            </a:r>
-            <a:r>
-              <a:rPr lang="en-US" dirty="0" err="1"/>
-              <a:t>DcMotor.RunMode.RUN_WITHOUT_ENCODER</a:t>
-            </a:r>
-            <a:r>
-              <a:rPr lang="en-US" dirty="0"/>
-              <a:t>);</a:t>
-            </a:r>
-          </a:p>
-          <a:p>
-            <a:endParaRPr lang="en-US" dirty="0"/>
-          </a:p>
-          <a:p>
-            <a:r>
-              <a:rPr lang="en-US" dirty="0" err="1"/>
-              <a:t>waitForStart</a:t>
-            </a:r>
-            <a:r>
-              <a:rPr lang="en-US" dirty="0"/>
-              <a:t>();</a:t>
-            </a:r>
-          </a:p>
-          <a:p>
-            <a:r>
-              <a:rPr lang="en-US" dirty="0" err="1"/>
-              <a:t>runtime.reset</a:t>
-            </a:r>
-            <a:r>
-              <a:rPr lang="en-US" dirty="0"/>
-              <a:t>();</a:t>
-            </a:r>
+              <a:rPr lang="en-US" sz="3200" dirty="0"/>
+              <a:t>Before downloading works you need to put LME-EV3_Firmware_1.10E.bin on the brick.</a:t>
+            </a:r>
+          </a:p>
+          <a:p>
+            <a:r>
+              <a:rPr lang="en-US" sz="3200" dirty="0"/>
+              <a:t>Follow the instructions on the site to get the file.</a:t>
+            </a:r>
+          </a:p>
+          <a:p>
+            <a:r>
+              <a:rPr lang="en-US" sz="3200" dirty="0"/>
+              <a:t>I used the old LEGO software to reflash the EV3 brick.</a:t>
+            </a:r>
+          </a:p>
+          <a:p>
             <a:endParaRPr lang="en-US" sz="3200" dirty="0"/>
           </a:p>
           <a:p>
@@ -15022,7 +15026,7 @@
           <p:cNvPr id="5" name="Footer Placeholder 4">
             <a:extLst>
               <a:ext uri="{FF2B5EF4-FFF2-40B4-BE49-F238E27FC236}">
-                <a16:creationId xmlns:a16="http://schemas.microsoft.com/office/drawing/2014/main" id="{4353D57D-D7BB-4279-B00B-766D16C17B35}"/>
+                <a16:creationId xmlns:a16="http://schemas.microsoft.com/office/drawing/2014/main" id="{4C814A7E-9E31-43BD-86E9-526B071558D0}"/>
               </a:ext>
             </a:extLst>
           </p:cNvPr>
@@ -15035,7 +15039,7 @@
         </p:nvSpPr>
         <p:spPr>
           <a:xfrm>
-            <a:off x="4232564" y="6331527"/>
+            <a:off x="561110" y="6220691"/>
             <a:ext cx="9081654" cy="374074"/>
           </a:xfrm>
         </p:spPr>
@@ -15057,7 +15061,7 @@
     </p:spTree>
     <p:extLst>
       <p:ext uri="{BB962C8B-B14F-4D97-AF65-F5344CB8AC3E}">
-        <p14:creationId xmlns:p14="http://schemas.microsoft.com/office/powerpoint/2010/main" val="1791378571"/>
+        <p14:creationId xmlns:p14="http://schemas.microsoft.com/office/powerpoint/2010/main" val="81605360"/>
       </p:ext>
     </p:extLst>
   </p:cSld>
@@ -15106,10 +15110,9 @@
           <a:lstStyle/>
           <a:p>
             <a:r>
-              <a:rPr lang="en-US" dirty="0" err="1"/>
-              <a:t>OnBot</a:t>
-            </a:r>
-            <a:endParaRPr lang="en-US" dirty="0"/>
+              <a:rPr lang="en-US" dirty="0"/>
+              <a:t>Downloading to EV3</a:t>
+            </a:r>
           </a:p>
         </p:txBody>
       </p:sp>
@@ -15129,129 +15132,41 @@
             <p:ph idx="1"/>
           </p:nvPr>
         </p:nvSpPr>
-        <p:spPr>
-          <a:xfrm>
-            <a:off x="1154954" y="2603500"/>
-            <a:ext cx="8825659" cy="4254500"/>
-          </a:xfrm>
-        </p:spPr>
+        <p:spPr/>
         <p:txBody>
           <a:bodyPr>
-            <a:normAutofit/>
+            <a:normAutofit fontScale="85000" lnSpcReduction="10000"/>
           </a:bodyPr>
           <a:lstStyle/>
           <a:p>
             <a:r>
-              <a:rPr lang="en-US" dirty="0"/>
-              <a:t>while (</a:t>
-            </a:r>
-            <a:r>
-              <a:rPr lang="en-US" dirty="0" err="1"/>
-              <a:t>opModeIsActive</a:t>
-            </a:r>
-            <a:r>
-              <a:rPr lang="en-US" dirty="0"/>
-              <a:t>()) {</a:t>
-            </a:r>
-          </a:p>
-          <a:p>
-            <a:r>
-              <a:rPr lang="en-US" dirty="0"/>
-              <a:t>Integer </a:t>
-            </a:r>
-            <a:r>
-              <a:rPr lang="en-US" dirty="0" err="1"/>
-              <a:t>rightEnc</a:t>
-            </a:r>
-            <a:r>
-              <a:rPr lang="en-US" dirty="0"/>
-              <a:t> = </a:t>
-            </a:r>
-            <a:r>
-              <a:rPr lang="en-US" dirty="0" err="1"/>
-              <a:t>rightMotor.getCurrentPosition</a:t>
-            </a:r>
-            <a:r>
-              <a:rPr lang="en-US" dirty="0"/>
-              <a:t>();</a:t>
-            </a:r>
-          </a:p>
-          <a:p>
-            <a:r>
-              <a:rPr lang="en-US" dirty="0" err="1"/>
-              <a:t>telemetry.addData</a:t>
-            </a:r>
-            <a:r>
-              <a:rPr lang="en-US" dirty="0"/>
-              <a:t>("Status", "Run Time: " + </a:t>
-            </a:r>
-            <a:r>
-              <a:rPr lang="en-US" dirty="0" err="1"/>
-              <a:t>runtime.toString</a:t>
-            </a:r>
-            <a:r>
-              <a:rPr lang="en-US" dirty="0"/>
-              <a:t>());</a:t>
-            </a:r>
-          </a:p>
-          <a:p>
-            <a:r>
-              <a:rPr lang="en-US" dirty="0" err="1"/>
-              <a:t>telemetry.addData</a:t>
-            </a:r>
-            <a:r>
-              <a:rPr lang="en-US" dirty="0"/>
-              <a:t>("R </a:t>
-            </a:r>
-            <a:r>
-              <a:rPr lang="en-US" dirty="0" err="1"/>
-              <a:t>Enocder</a:t>
-            </a:r>
-            <a:r>
-              <a:rPr lang="en-US" dirty="0"/>
-              <a:t>", </a:t>
-            </a:r>
-            <a:r>
-              <a:rPr lang="en-US" dirty="0" err="1"/>
-              <a:t>rightEnc.toString</a:t>
-            </a:r>
-            <a:r>
-              <a:rPr lang="en-US" dirty="0"/>
-              <a:t>());</a:t>
-            </a:r>
-          </a:p>
-          <a:p>
-            <a:r>
-              <a:rPr lang="en-US" dirty="0" err="1"/>
-              <a:t>telemetry.update</a:t>
-            </a:r>
-            <a:r>
-              <a:rPr lang="en-US" dirty="0"/>
-              <a:t>();</a:t>
-            </a:r>
-          </a:p>
-          <a:p>
-            <a:endParaRPr lang="en-US" dirty="0"/>
-          </a:p>
-          <a:p>
-            <a:r>
-              <a:rPr lang="en-US" dirty="0" err="1"/>
-              <a:t>leftMotor.setPower</a:t>
-            </a:r>
-            <a:r>
-              <a:rPr lang="en-US" dirty="0"/>
-              <a:t>(-gamepad1.left_stick_y);</a:t>
-            </a:r>
-          </a:p>
-          <a:p>
-            <a:r>
-              <a:rPr lang="en-US" dirty="0" err="1"/>
-              <a:t>rightMotor.setPower</a:t>
-            </a:r>
-            <a:r>
-              <a:rPr lang="en-US" dirty="0"/>
-              <a:t>(-gamepad1.right_stick_y);</a:t>
-            </a:r>
+              <a:rPr lang="en-US" sz="3200" dirty="0"/>
+              <a:t>Once the firmware is on, a new drive will appear on your computer.</a:t>
+            </a:r>
+          </a:p>
+          <a:p>
+            <a:r>
+              <a:rPr lang="en-US" sz="3200" dirty="0"/>
+              <a:t>Click download and the Save/Save As option will appear.  Save As the file to the new drive.</a:t>
+            </a:r>
+          </a:p>
+          <a:p>
+            <a:r>
+              <a:rPr lang="en-US" sz="3200" dirty="0"/>
+              <a:t>The EV3 will reset and start running the program.</a:t>
+            </a:r>
+          </a:p>
+          <a:p>
+            <a:r>
+              <a:rPr lang="en-US" sz="3200" dirty="0"/>
+              <a:t>You can stop and restart from the EV3 controls.</a:t>
+            </a:r>
+          </a:p>
+          <a:p>
+            <a:endParaRPr lang="en-US" sz="3200" dirty="0"/>
+          </a:p>
+          <a:p>
+            <a:endParaRPr lang="en-US" sz="3000" dirty="0"/>
           </a:p>
         </p:txBody>
       </p:sp>
@@ -15260,7 +15175,7 @@
           <p:cNvPr id="5" name="Footer Placeholder 4">
             <a:extLst>
               <a:ext uri="{FF2B5EF4-FFF2-40B4-BE49-F238E27FC236}">
-                <a16:creationId xmlns:a16="http://schemas.microsoft.com/office/drawing/2014/main" id="{6DAB2D4F-8139-48F5-8F3B-2DD4E9DE0A09}"/>
+                <a16:creationId xmlns:a16="http://schemas.microsoft.com/office/drawing/2014/main" id="{4C814A7E-9E31-43BD-86E9-526B071558D0}"/>
               </a:ext>
             </a:extLst>
           </p:cNvPr>
@@ -15273,7 +15188,7 @@
         </p:nvSpPr>
         <p:spPr>
           <a:xfrm>
-            <a:off x="270164" y="6289964"/>
+            <a:off x="561110" y="6220691"/>
             <a:ext cx="9081654" cy="374074"/>
           </a:xfrm>
         </p:spPr>
@@ -15295,7 +15210,7 @@
     </p:spTree>
     <p:extLst>
       <p:ext uri="{BB962C8B-B14F-4D97-AF65-F5344CB8AC3E}">
-        <p14:creationId xmlns:p14="http://schemas.microsoft.com/office/powerpoint/2010/main" val="3071680911"/>
+        <p14:creationId xmlns:p14="http://schemas.microsoft.com/office/powerpoint/2010/main" val="3922400858"/>
       </p:ext>
     </p:extLst>
   </p:cSld>
@@ -15494,7 +15409,7 @@
           <a:p>
             <a:r>
               <a:rPr lang="en-US" dirty="0"/>
-              <a:t>Color Sensor</a:t>
+              <a:t>Downloading to EV3</a:t>
             </a:r>
           </a:p>
         </p:txBody>
@@ -15515,22 +15430,41 @@
             <p:ph idx="1"/>
           </p:nvPr>
         </p:nvSpPr>
-        <p:spPr>
-          <a:xfrm>
-            <a:off x="1154954" y="2603500"/>
-            <a:ext cx="8825659" cy="3784048"/>
-          </a:xfrm>
-        </p:spPr>
+        <p:spPr/>
         <p:txBody>
           <a:bodyPr>
-            <a:normAutofit/>
+            <a:normAutofit fontScale="85000" lnSpcReduction="10000"/>
           </a:bodyPr>
           <a:lstStyle/>
           <a:p>
             <a:r>
-              <a:rPr lang="en-US" sz="4000" dirty="0"/>
-              <a:t>Run the Color Sensor Example</a:t>
-            </a:r>
+              <a:rPr lang="en-US" sz="3200" dirty="0"/>
+              <a:t>Once the firmware is on, a new drive will appear on your computer.</a:t>
+            </a:r>
+          </a:p>
+          <a:p>
+            <a:r>
+              <a:rPr lang="en-US" sz="3200" dirty="0"/>
+              <a:t>Click download and the Save/Save As option will appear.  Save As the file to the new drive.</a:t>
+            </a:r>
+          </a:p>
+          <a:p>
+            <a:r>
+              <a:rPr lang="en-US" sz="3200" dirty="0"/>
+              <a:t>The EV3 will reset and start running the program.</a:t>
+            </a:r>
+          </a:p>
+          <a:p>
+            <a:r>
+              <a:rPr lang="en-US" sz="3200" dirty="0"/>
+              <a:t>You can stop and restart from the EV3 controls.</a:t>
+            </a:r>
+          </a:p>
+          <a:p>
+            <a:endParaRPr lang="en-US" sz="3200" dirty="0"/>
+          </a:p>
+          <a:p>
+            <a:endParaRPr lang="en-US" sz="3000" dirty="0"/>
           </a:p>
         </p:txBody>
       </p:sp>
@@ -15539,7 +15473,7 @@
           <p:cNvPr id="5" name="Footer Placeholder 4">
             <a:extLst>
               <a:ext uri="{FF2B5EF4-FFF2-40B4-BE49-F238E27FC236}">
-                <a16:creationId xmlns:a16="http://schemas.microsoft.com/office/drawing/2014/main" id="{7D5731BC-2117-4C61-8BD3-7508B829E606}"/>
+                <a16:creationId xmlns:a16="http://schemas.microsoft.com/office/drawing/2014/main" id="{4C814A7E-9E31-43BD-86E9-526B071558D0}"/>
               </a:ext>
             </a:extLst>
           </p:cNvPr>
@@ -15552,7 +15486,7 @@
         </p:nvSpPr>
         <p:spPr>
           <a:xfrm>
-            <a:off x="270165" y="6387548"/>
+            <a:off x="561110" y="6220691"/>
             <a:ext cx="9081654" cy="374074"/>
           </a:xfrm>
         </p:spPr>
@@ -15574,7 +15508,7 @@
     </p:spTree>
     <p:extLst>
       <p:ext uri="{BB962C8B-B14F-4D97-AF65-F5344CB8AC3E}">
-        <p14:creationId xmlns:p14="http://schemas.microsoft.com/office/powerpoint/2010/main" val="2805306627"/>
+        <p14:creationId xmlns:p14="http://schemas.microsoft.com/office/powerpoint/2010/main" val="843912765"/>
       </p:ext>
     </p:extLst>
   </p:cSld>
@@ -16829,34 +16763,25 @@
         <p:spPr/>
         <p:txBody>
           <a:bodyPr>
-            <a:normAutofit fontScale="92500"/>
+            <a:normAutofit/>
           </a:bodyPr>
           <a:lstStyle/>
           <a:p>
             <a:r>
               <a:rPr lang="en-US" sz="3200" dirty="0"/>
-              <a:t>Under the settings you will find tools to set the names of the phones.</a:t>
-            </a:r>
-          </a:p>
-          <a:p>
-            <a:pPr lvl="1"/>
-            <a:r>
-              <a:rPr lang="en-US" sz="3000" dirty="0"/>
-              <a:t>&lt;team number&gt;-DS for Driver station</a:t>
-            </a:r>
-          </a:p>
-          <a:p>
-            <a:pPr lvl="1"/>
-            <a:r>
-              <a:rPr lang="en-US" sz="3000" dirty="0"/>
-              <a:t>&lt;team number&gt;-RC for Robot Controller</a:t>
+              <a:t>To be honest I was not looking forward to writing this.</a:t>
             </a:r>
           </a:p>
           <a:p>
             <a:r>
               <a:rPr lang="en-US" sz="3200" dirty="0"/>
-              <a:t>Spare phones user letters between the team number and the –XX.  Like 4444-B-RC</a:t>
-            </a:r>
+              <a:t>Searched for </a:t>
+            </a:r>
+            <a:r>
+              <a:rPr lang="en-US" sz="3200" dirty="0" err="1"/>
+              <a:t>MakeCode</a:t>
+            </a:r>
+            <a:endParaRPr lang="en-US" sz="3200" dirty="0"/>
           </a:p>
         </p:txBody>
       </p:sp>
@@ -16948,19 +16873,74 @@
           <a:bodyPr/>
           <a:lstStyle/>
           <a:p>
-            <a:r>
-              <a:rPr lang="en-US" dirty="0"/>
-              <a:t>Setting up the phones</a:t>
-            </a:r>
+            <a:pPr lvl="1"/>
+            <a:r>
+              <a:rPr lang="en-US" sz="3200" dirty="0">
+                <a:solidFill>
+                  <a:schemeClr val="bg1"/>
+                </a:solidFill>
+              </a:rPr>
+              <a:t>Microsoft </a:t>
+            </a:r>
+            <a:r>
+              <a:rPr lang="en-US" sz="3200" dirty="0" err="1">
+                <a:solidFill>
+                  <a:schemeClr val="bg1"/>
+                </a:solidFill>
+              </a:rPr>
+              <a:t>MakeCode</a:t>
+            </a:r>
+            <a:endParaRPr lang="en-US" sz="3200" dirty="0">
+              <a:solidFill>
+                <a:schemeClr val="bg1"/>
+              </a:solidFill>
+            </a:endParaRPr>
           </a:p>
         </p:txBody>
       </p:sp>
       <p:sp>
         <p:nvSpPr>
-          <p:cNvPr id="3" name="Content Placeholder 2">
+          <p:cNvPr id="5" name="Footer Placeholder 4">
             <a:extLst>
               <a:ext uri="{FF2B5EF4-FFF2-40B4-BE49-F238E27FC236}">
-                <a16:creationId xmlns:a16="http://schemas.microsoft.com/office/drawing/2014/main" id="{B50147CF-DAA8-4BEB-A969-D6D9FECE042F}"/>
+                <a16:creationId xmlns:a16="http://schemas.microsoft.com/office/drawing/2014/main" id="{EC952921-544E-4F77-8675-F6260F7DB676}"/>
+              </a:ext>
+            </a:extLst>
+          </p:cNvPr>
+          <p:cNvSpPr>
+            <a:spLocks noGrp="1"/>
+          </p:cNvSpPr>
+          <p:nvPr>
+            <p:ph type="ftr" sz="quarter" idx="11"/>
+          </p:nvPr>
+        </p:nvSpPr>
+        <p:spPr>
+          <a:xfrm>
+            <a:off x="145474" y="6359237"/>
+            <a:ext cx="9081654" cy="374074"/>
+          </a:xfrm>
+        </p:spPr>
+        <p:txBody>
+          <a:bodyPr/>
+          <a:lstStyle/>
+          <a:p>
+            <a:r>
+              <a:rPr lang="en-US" sz="2400" dirty="0">
+                <a:solidFill>
+                  <a:schemeClr val="tx1"/>
+                </a:solidFill>
+              </a:rPr>
+              <a:t>https://github.com/JimWright4089/FIRSTWorkshops</a:t>
+            </a:r>
+          </a:p>
+        </p:txBody>
+      </p:sp>
+      <p:sp>
+        <p:nvSpPr>
+          <p:cNvPr id="6" name="Content Placeholder 5">
+            <a:extLst>
+              <a:ext uri="{FF2B5EF4-FFF2-40B4-BE49-F238E27FC236}">
+                <a16:creationId xmlns:a16="http://schemas.microsoft.com/office/drawing/2014/main" id="{91E78B8E-E4EF-42A9-BCA6-AAD7C9002E49}"/>
               </a:ext>
             </a:extLst>
           </p:cNvPr>
@@ -16973,65 +16953,47 @@
         </p:nvSpPr>
         <p:spPr/>
         <p:txBody>
-          <a:bodyPr>
-            <a:normAutofit/>
-          </a:bodyPr>
+          <a:bodyPr/>
           <a:lstStyle/>
           <a:p>
-            <a:r>
-              <a:rPr lang="en-US" sz="3200" dirty="0"/>
-              <a:t>Connect the Driver station to a joystick, or hub with two joysticks connected to it, through a OTG cable.</a:t>
-            </a:r>
-          </a:p>
-          <a:p>
-            <a:r>
-              <a:rPr lang="en-US" sz="3200" dirty="0"/>
-              <a:t>Connect the Robot Controller to the Robot through a Mini B to Micro B cable.</a:t>
-            </a:r>
+            <a:endParaRPr lang="en-US"/>
           </a:p>
         </p:txBody>
       </p:sp>
-      <p:sp>
-        <p:nvSpPr>
-          <p:cNvPr id="5" name="Footer Placeholder 4">
+      <p:pic>
+        <p:nvPicPr>
+          <p:cNvPr id="10" name="Picture 9">
             <a:extLst>
               <a:ext uri="{FF2B5EF4-FFF2-40B4-BE49-F238E27FC236}">
-                <a16:creationId xmlns:a16="http://schemas.microsoft.com/office/drawing/2014/main" id="{82484588-9CFE-4A0D-93C3-72A99A666C57}"/>
+                <a16:creationId xmlns:a16="http://schemas.microsoft.com/office/drawing/2014/main" id="{BA95556C-15BF-440F-8093-E5972A722BB2}"/>
               </a:ext>
             </a:extLst>
           </p:cNvPr>
-          <p:cNvSpPr>
-            <a:spLocks noGrp="1"/>
-          </p:cNvSpPr>
-          <p:nvPr>
-            <p:ph type="ftr" sz="quarter" idx="11"/>
-          </p:nvPr>
-        </p:nvSpPr>
+          <p:cNvPicPr>
+            <a:picLocks noChangeAspect="1"/>
+          </p:cNvPicPr>
+          <p:nvPr/>
+        </p:nvPicPr>
+        <p:blipFill>
+          <a:blip r:embed="rId2"/>
+          <a:stretch>
+            <a:fillRect/>
+          </a:stretch>
+        </p:blipFill>
         <p:spPr>
           <a:xfrm>
-            <a:off x="200892" y="6262255"/>
-            <a:ext cx="9081654" cy="374074"/>
+            <a:off x="1462848" y="1743439"/>
+            <a:ext cx="8209870" cy="4615798"/>
           </a:xfrm>
+          <a:prstGeom prst="rect">
+            <a:avLst/>
+          </a:prstGeom>
         </p:spPr>
-        <p:txBody>
-          <a:bodyPr/>
-          <a:lstStyle/>
-          <a:p>
-            <a:r>
-              <a:rPr lang="en-US" sz="2400" dirty="0">
-                <a:solidFill>
-                  <a:schemeClr val="tx1"/>
-                </a:solidFill>
-              </a:rPr>
-              <a:t>https://github.com/JimWright4089/FIRSTWorkshops</a:t>
-            </a:r>
-          </a:p>
-        </p:txBody>
-      </p:sp>
+      </p:pic>
     </p:spTree>
     <p:extLst>
       <p:ext uri="{BB962C8B-B14F-4D97-AF65-F5344CB8AC3E}">
-        <p14:creationId xmlns:p14="http://schemas.microsoft.com/office/powerpoint/2010/main" val="3606440120"/>
+        <p14:creationId xmlns:p14="http://schemas.microsoft.com/office/powerpoint/2010/main" val="2433169245"/>
       </p:ext>
     </p:extLst>
   </p:cSld>

</xml_diff>